<commit_message>
Fix: Update presentation file
Co-authored-by: 2780200320 <2780200320@qq.com>
</commit_message>
<xml_diff>
--- a/德图仪表采集方案.pptx
+++ b/德图仪表采集方案.pptx
@@ -22,6 +22,12 @@
     <p:sldId id="275" r:id="rId15"/>
     <p:sldId id="276" r:id="rId16"/>
     <p:sldId id="270" r:id="rId17"/>
+    <p:sldId id="278" r:id="rId21"/>
+    <p:sldId id="279" r:id="rId22"/>
+    <p:sldId id="280" r:id="rId23"/>
+    <p:sldId id="281" r:id="rId24"/>
+    <p:sldId id="282" r:id="rId25"/>
+    <p:sldId id="283" r:id="rId26"/>
   </p:sldIdLst>
   <p:sldSz cx="12192000" cy="6858000"/>
   <p:notesSz cx="6858000" cy="9144000"/>
@@ -16654,6 +16660,1399 @@
 </p:sld>
 </file>
 
+<file path=ppt/slides/slide15.xml><?xml version="1.0" encoding="utf-8"?>
+<p:sld xmlns:a="http://schemas.openxmlformats.org/drawingml/2006/main" xmlns:p="http://schemas.openxmlformats.org/presentationml/2006/main" xmlns:r="http://schemas.openxmlformats.org/officeDocument/2006/relationships">
+  <p:cSld>
+    <p:spTree>
+      <p:nvGrpSpPr>
+        <p:cNvPr id="1" name=""/>
+        <p:cNvGrpSpPr/>
+        <p:nvPr/>
+      </p:nvGrpSpPr>
+      <p:grpSpPr/>
+      <p:sp>
+        <p:nvSpPr>
+          <p:cNvPr id="2" name="Title 1"/>
+          <p:cNvSpPr>
+            <a:spLocks noGrp="1"/>
+          </p:cNvSpPr>
+          <p:nvPr>
+            <p:ph type="title"/>
+          </p:nvPr>
+        </p:nvSpPr>
+        <p:spPr/>
+        <p:txBody>
+          <a:bodyPr/>
+          <a:lstStyle/>
+          <a:p>
+            <a:r>
+              <a:t>详细技术方案</a:t>
+            </a:r>
+          </a:p>
+        </p:txBody>
+      </p:sp>
+      <p:sp>
+        <p:nvSpPr>
+          <p:cNvPr id="3" name="Content Placeholder 2"/>
+          <p:cNvSpPr>
+            <a:spLocks noGrp="1"/>
+          </p:cNvSpPr>
+          <p:nvPr>
+            <p:ph idx="1"/>
+          </p:nvPr>
+        </p:nvSpPr>
+        <p:spPr/>
+        <p:txBody>
+          <a:bodyPr/>
+          <a:lstStyle/>
+          <a:p/>
+        </p:txBody>
+      </p:sp>
+      <p:sp>
+        <p:nvSpPr>
+          <p:cNvPr id="4" name="TextBox 3"/>
+          <p:cNvSpPr txBox="1"/>
+          <p:nvPr/>
+        </p:nvSpPr>
+        <p:spPr>
+          <a:xfrm>
+            <a:off x="457200" y="1097280"/>
+            <a:ext cx="8229600" cy="5029200"/>
+          </a:xfrm>
+          <a:prstGeom prst="rect">
+            <a:avLst/>
+          </a:prstGeom>
+          <a:noFill/>
+        </p:spPr>
+        <p:txBody>
+          <a:bodyPr wrap="square">
+            <a:spAutoFit/>
+          </a:bodyPr>
+          <a:lstStyle/>
+          <a:p>
+            <a:pPr>
+              <a:defRPr sz="1200">
+                <a:latin typeface="微软雅黑"/>
+              </a:defRPr>
+            </a:pPr>
+            <a:r>
+              <a:t>一、测试参数配置</a:t>
+            </a:r>
+          </a:p>
+          <a:p>
+            <a:pPr>
+              <a:defRPr sz="1200">
+                <a:latin typeface="微软雅黑"/>
+              </a:defRPr>
+            </a:pPr>
+            <a:r>
+              <a:t>• 测试时长：15秒</a:t>
+            </a:r>
+          </a:p>
+          <a:p>
+            <a:pPr>
+              <a:defRPr sz="1200">
+                <a:latin typeface="微软雅黑"/>
+              </a:defRPr>
+            </a:pPr>
+            <a:r>
+              <a:t>• 采样频率：50Hz（采样间隔20ms）</a:t>
+            </a:r>
+          </a:p>
+          <a:p>
+            <a:pPr>
+              <a:defRPr sz="1200">
+                <a:latin typeface="微软雅黑"/>
+              </a:defRPr>
+            </a:pPr>
+            <a:r>
+              <a:t>• 通道配置：DAQM909A 4通道同步采样（通道101-104）</a:t>
+            </a:r>
+          </a:p>
+          <a:p>
+            <a:pPr>
+              <a:defRPr sz="1200">
+                <a:latin typeface="微软雅黑"/>
+              </a:defRPr>
+            </a:pPr>
+            <a:r>
+              <a:t>• 总采样点数：750点（15秒 × 50Hz）</a:t>
+            </a:r>
+          </a:p>
+          <a:p>
+            <a:pPr>
+              <a:defRPr sz="1200">
+                <a:latin typeface="微软雅黑"/>
+              </a:defRPr>
+            </a:pPr>
+          </a:p>
+          <a:p>
+            <a:pPr>
+              <a:defRPr sz="1200">
+                <a:latin typeface="微软雅黑"/>
+              </a:defRPr>
+            </a:pPr>
+            <a:r>
+              <a:t>二、测量模式选择</a:t>
+            </a:r>
+          </a:p>
+          <a:p>
+            <a:pPr>
+              <a:defRPr sz="1200">
+                <a:latin typeface="微软雅黑"/>
+              </a:defRPr>
+            </a:pPr>
+            <a:r>
+              <a:t>• 推荐使用电阻测量模式，软件中转换为温度</a:t>
+            </a:r>
+          </a:p>
+          <a:p>
+            <a:pPr>
+              <a:defRPr sz="1200">
+                <a:latin typeface="微软雅黑"/>
+              </a:defRPr>
+            </a:pPr>
+            <a:r>
+              <a:t>• 测量量程：根据NTC阻值范围选择（建议10kΩ量程）</a:t>
+            </a:r>
+          </a:p>
+          <a:p>
+            <a:pPr>
+              <a:defRPr sz="1200">
+                <a:latin typeface="微软雅黑"/>
+              </a:defRPr>
+            </a:pPr>
+            <a:r>
+              <a:t>• 精度：6.5位分辨率，满足测试需求</a:t>
+            </a:r>
+          </a:p>
+          <a:p>
+            <a:pPr>
+              <a:defRPr sz="1200">
+                <a:latin typeface="微软雅黑"/>
+              </a:defRPr>
+            </a:pPr>
+          </a:p>
+          <a:p>
+            <a:pPr>
+              <a:defRPr sz="1200">
+                <a:latin typeface="微软雅黑"/>
+              </a:defRPr>
+            </a:pPr>
+            <a:r>
+              <a:t>三、数据采集流程</a:t>
+            </a:r>
+          </a:p>
+          <a:p>
+            <a:pPr>
+              <a:defRPr sz="1200">
+                <a:latin typeface="微软雅黑"/>
+              </a:defRPr>
+            </a:pPr>
+            <a:r>
+              <a:t>1. 系统初始化：连接仪器、配置通道、设置参数</a:t>
+            </a:r>
+          </a:p>
+          <a:p>
+            <a:pPr>
+              <a:defRPr sz="1200">
+                <a:latin typeface="微软雅黑"/>
+              </a:defRPr>
+            </a:pPr>
+            <a:r>
+              <a:t>2. 开始采集：4通道同步采样，50Hz频率</a:t>
+            </a:r>
+          </a:p>
+          <a:p>
+            <a:pPr>
+              <a:defRPr sz="1200">
+                <a:latin typeface="微软雅黑"/>
+              </a:defRPr>
+            </a:pPr>
+            <a:r>
+              <a:t>3. 实时处理：数据解析、温度转换、异常检测</a:t>
+            </a:r>
+          </a:p>
+          <a:p>
+            <a:pPr>
+              <a:defRPr sz="1200">
+                <a:latin typeface="微软雅黑"/>
+              </a:defRPr>
+            </a:pPr>
+            <a:r>
+              <a:t>4. 结果判断：入水时刻检测、稳定值判断、T50计算</a:t>
+            </a:r>
+          </a:p>
+          <a:p>
+            <a:pPr>
+              <a:defRPr sz="1200">
+                <a:latin typeface="微软雅黑"/>
+              </a:defRPr>
+            </a:pPr>
+            <a:r>
+              <a:t>5. 数据保存：保存原始数据和处理结果</a:t>
+            </a:r>
+          </a:p>
+        </p:txBody>
+      </p:sp>
+    </p:spTree>
+  </p:cSld>
+  <p:clrMapOvr>
+    <a:masterClrMapping/>
+  </p:clrMapOvr>
+</p:sld>
+</file>
+
+<file path=ppt/slides/slide16.xml><?xml version="1.0" encoding="utf-8"?>
+<p:sld xmlns:a="http://schemas.openxmlformats.org/drawingml/2006/main" xmlns:p="http://schemas.openxmlformats.org/presentationml/2006/main" xmlns:r="http://schemas.openxmlformats.org/officeDocument/2006/relationships">
+  <p:cSld>
+    <p:spTree>
+      <p:nvGrpSpPr>
+        <p:cNvPr id="1" name=""/>
+        <p:cNvGrpSpPr/>
+        <p:nvPr/>
+      </p:nvGrpSpPr>
+      <p:grpSpPr/>
+      <p:sp>
+        <p:nvSpPr>
+          <p:cNvPr id="2" name="Title 1"/>
+          <p:cNvSpPr>
+            <a:spLocks noGrp="1"/>
+          </p:cNvSpPr>
+          <p:nvPr>
+            <p:ph type="title"/>
+          </p:nvPr>
+        </p:nvSpPr>
+        <p:spPr/>
+        <p:txBody>
+          <a:bodyPr/>
+          <a:lstStyle/>
+          <a:p>
+            <a:r>
+              <a:t>数据处理算法</a:t>
+            </a:r>
+          </a:p>
+        </p:txBody>
+      </p:sp>
+      <p:sp>
+        <p:nvSpPr>
+          <p:cNvPr id="3" name="Content Placeholder 2"/>
+          <p:cNvSpPr>
+            <a:spLocks noGrp="1"/>
+          </p:cNvSpPr>
+          <p:nvPr>
+            <p:ph idx="1"/>
+          </p:nvPr>
+        </p:nvSpPr>
+        <p:spPr/>
+        <p:txBody>
+          <a:bodyPr/>
+          <a:lstStyle/>
+          <a:p/>
+        </p:txBody>
+      </p:sp>
+      <p:sp>
+        <p:nvSpPr>
+          <p:cNvPr id="4" name="TextBox 3"/>
+          <p:cNvSpPr txBox="1"/>
+          <p:nvPr/>
+        </p:nvSpPr>
+        <p:spPr>
+          <a:xfrm>
+            <a:off x="457200" y="1097280"/>
+            <a:ext cx="8229600" cy="5029200"/>
+          </a:xfrm>
+          <a:prstGeom prst="rect">
+            <a:avLst/>
+          </a:prstGeom>
+          <a:noFill/>
+        </p:spPr>
+        <p:txBody>
+          <a:bodyPr wrap="square">
+            <a:spAutoFit/>
+          </a:bodyPr>
+          <a:lstStyle/>
+          <a:p>
+            <a:pPr>
+              <a:defRPr sz="1200">
+                <a:latin typeface="微软雅黑"/>
+              </a:defRPr>
+            </a:pPr>
+            <a:r>
+              <a:t>一、入水时刻检测算法</a:t>
+            </a:r>
+          </a:p>
+          <a:p>
+            <a:pPr>
+              <a:defRPr sz="1200">
+                <a:latin typeface="微软雅黑"/>
+              </a:defRPr>
+            </a:pPr>
+            <a:r>
+              <a:t>• 检测连续多个数据点的阻值下降</a:t>
+            </a:r>
+          </a:p>
+          <a:p>
+            <a:pPr>
+              <a:defRPr sz="1200">
+                <a:latin typeface="微软雅黑"/>
+              </a:defRPr>
+            </a:pPr>
+            <a:r>
+              <a:t>• 下降幅度超过设定阈值（如5%）</a:t>
+            </a:r>
+          </a:p>
+          <a:p>
+            <a:pPr>
+              <a:defRPr sz="1200">
+                <a:latin typeface="微软雅黑"/>
+              </a:defRPr>
+            </a:pPr>
+            <a:r>
+              <a:t>• 标记为入水时刻点（Msr Moment）</a:t>
+            </a:r>
+          </a:p>
+          <a:p>
+            <a:pPr>
+              <a:defRPr sz="1200">
+                <a:latin typeface="微软雅黑"/>
+              </a:defRPr>
+            </a:pPr>
+          </a:p>
+          <a:p>
+            <a:pPr>
+              <a:defRPr sz="1200">
+                <a:latin typeface="微软雅黑"/>
+              </a:defRPr>
+            </a:pPr>
+            <a:r>
+              <a:t>二、稳定阻值判断</a:t>
+            </a:r>
+          </a:p>
+          <a:p>
+            <a:pPr>
+              <a:defRPr sz="1200">
+                <a:latin typeface="微软雅黑"/>
+              </a:defRPr>
+            </a:pPr>
+            <a:r>
+              <a:t>• 检测阻值变化率小于阈值</a:t>
+            </a:r>
+          </a:p>
+          <a:p>
+            <a:pPr>
+              <a:defRPr sz="1200">
+                <a:latin typeface="微软雅黑"/>
+              </a:defRPr>
+            </a:pPr>
+            <a:r>
+              <a:t>• 或检测到最小阻值点（最终点）</a:t>
+            </a:r>
+          </a:p>
+          <a:p>
+            <a:pPr>
+              <a:defRPr sz="1200">
+                <a:latin typeface="微软雅黑"/>
+              </a:defRPr>
+            </a:pPr>
+            <a:r>
+              <a:t>• 记录最终稳定阻值</a:t>
+            </a:r>
+          </a:p>
+          <a:p>
+            <a:pPr>
+              <a:defRPr sz="1200">
+                <a:latin typeface="微软雅黑"/>
+              </a:defRPr>
+            </a:pPr>
+          </a:p>
+          <a:p>
+            <a:pPr>
+              <a:defRPr sz="1200">
+                <a:latin typeface="微软雅黑"/>
+              </a:defRPr>
+            </a:pPr>
+            <a:r>
+              <a:t>三、T50时间常数计算</a:t>
+            </a:r>
+          </a:p>
+          <a:p>
+            <a:pPr>
+              <a:defRPr sz="1200">
+                <a:latin typeface="微软雅黑"/>
+              </a:defRPr>
+            </a:pPr>
+            <a:r>
+              <a:t>• T50 = (R入水 - R最终) / 2 + R最终</a:t>
+            </a:r>
+          </a:p>
+          <a:p>
+            <a:pPr>
+              <a:defRPr sz="1200">
+                <a:latin typeface="微软雅黑"/>
+              </a:defRPr>
+            </a:pPr>
+            <a:r>
+              <a:t>• 在数据序列中找到最接近T50阻值的时刻点</a:t>
+            </a:r>
+          </a:p>
+          <a:p>
+            <a:pPr>
+              <a:defRPr sz="1200">
+                <a:latin typeface="微软雅黑"/>
+              </a:defRPr>
+            </a:pPr>
+            <a:r>
+              <a:t>• 计算时间差：T50时刻 - 入水时刻</a:t>
+            </a:r>
+          </a:p>
+          <a:p>
+            <a:pPr>
+              <a:defRPr sz="1200">
+                <a:latin typeface="微软雅黑"/>
+              </a:defRPr>
+            </a:pPr>
+          </a:p>
+          <a:p>
+            <a:pPr>
+              <a:defRPr sz="1200">
+                <a:latin typeface="微软雅黑"/>
+              </a:defRPr>
+            </a:pPr>
+            <a:r>
+              <a:t>四、温度转换（如需要）</a:t>
+            </a:r>
+          </a:p>
+          <a:p>
+            <a:pPr>
+              <a:defRPr sz="1200">
+                <a:latin typeface="微软雅黑"/>
+              </a:defRPr>
+            </a:pPr>
+            <a:r>
+              <a:t>• Beta方程：1/T = 1/T0 + (1/Beta) × ln(R/R0)</a:t>
+            </a:r>
+          </a:p>
+          <a:p>
+            <a:pPr>
+              <a:defRPr sz="1200">
+                <a:latin typeface="微软雅黑"/>
+              </a:defRPr>
+            </a:pPr>
+            <a:r>
+              <a:t>• 参数：R0（参考电阻）、T0（参考温度）、Beta值</a:t>
+            </a:r>
+          </a:p>
+          <a:p>
+            <a:pPr>
+              <a:defRPr sz="1200">
+                <a:latin typeface="微软雅黑"/>
+              </a:defRPr>
+            </a:pPr>
+            <a:r>
+              <a:t>• 或使用Steinhart-Hart方程（更高精度）</a:t>
+            </a:r>
+          </a:p>
+        </p:txBody>
+      </p:sp>
+    </p:spTree>
+  </p:cSld>
+  <p:clrMapOvr>
+    <a:masterClrMapping/>
+  </p:clrMapOvr>
+</p:sld>
+</file>
+
+<file path=ppt/slides/slide17.xml><?xml version="1.0" encoding="utf-8"?>
+<p:sld xmlns:a="http://schemas.openxmlformats.org/drawingml/2006/main" xmlns:p="http://schemas.openxmlformats.org/presentationml/2006/main" xmlns:r="http://schemas.openxmlformats.org/officeDocument/2006/relationships">
+  <p:cSld>
+    <p:spTree>
+      <p:nvGrpSpPr>
+        <p:cNvPr id="1" name=""/>
+        <p:cNvGrpSpPr/>
+        <p:nvPr/>
+      </p:nvGrpSpPr>
+      <p:grpSpPr/>
+      <p:sp>
+        <p:nvSpPr>
+          <p:cNvPr id="2" name="Title 1"/>
+          <p:cNvSpPr>
+            <a:spLocks noGrp="1"/>
+          </p:cNvSpPr>
+          <p:nvPr>
+            <p:ph type="title"/>
+          </p:nvPr>
+        </p:nvSpPr>
+        <p:spPr/>
+        <p:txBody>
+          <a:bodyPr/>
+          <a:lstStyle/>
+          <a:p>
+            <a:r>
+              <a:t>C#软件架构设计</a:t>
+            </a:r>
+          </a:p>
+        </p:txBody>
+      </p:sp>
+      <p:sp>
+        <p:nvSpPr>
+          <p:cNvPr id="3" name="Content Placeholder 2"/>
+          <p:cNvSpPr>
+            <a:spLocks noGrp="1"/>
+          </p:cNvSpPr>
+          <p:nvPr>
+            <p:ph idx="1"/>
+          </p:nvPr>
+        </p:nvSpPr>
+        <p:spPr/>
+        <p:txBody>
+          <a:bodyPr/>
+          <a:lstStyle/>
+          <a:p/>
+        </p:txBody>
+      </p:sp>
+      <p:sp>
+        <p:nvSpPr>
+          <p:cNvPr id="4" name="TextBox 3"/>
+          <p:cNvSpPr txBox="1"/>
+          <p:nvPr/>
+        </p:nvSpPr>
+        <p:spPr>
+          <a:xfrm>
+            <a:off x="457200" y="1097280"/>
+            <a:ext cx="8229600" cy="5029200"/>
+          </a:xfrm>
+          <a:prstGeom prst="rect">
+            <a:avLst/>
+          </a:prstGeom>
+          <a:noFill/>
+        </p:spPr>
+        <p:txBody>
+          <a:bodyPr wrap="square">
+            <a:spAutoFit/>
+          </a:bodyPr>
+          <a:lstStyle/>
+          <a:p>
+            <a:pPr>
+              <a:defRPr sz="1200">
+                <a:latin typeface="微软雅黑"/>
+              </a:defRPr>
+            </a:pPr>
+            <a:r>
+              <a:t>一、技术选型</a:t>
+            </a:r>
+          </a:p>
+          <a:p>
+            <a:pPr>
+              <a:defRPr sz="1200">
+                <a:latin typeface="微软雅黑"/>
+              </a:defRPr>
+            </a:pPr>
+            <a:r>
+              <a:t>• 开发环境：.NET Framework 4.7+ / .NET Core 3.1+</a:t>
+            </a:r>
+          </a:p>
+          <a:p>
+            <a:pPr>
+              <a:defRPr sz="1200">
+                <a:latin typeface="微软雅黑"/>
+              </a:defRPr>
+            </a:pPr>
+            <a:r>
+              <a:t>• VISA通信：Keysight IO Libraries Suite + VISA.NET</a:t>
+            </a:r>
+          </a:p>
+          <a:p>
+            <a:pPr>
+              <a:defRPr sz="1200">
+                <a:latin typeface="微软雅黑"/>
+              </a:defRPr>
+            </a:pPr>
+            <a:r>
+              <a:t>• 图表控件：OxyPlot 或 LiveCharts（实时曲线显示）</a:t>
+            </a:r>
+          </a:p>
+          <a:p>
+            <a:pPr>
+              <a:defRPr sz="1200">
+                <a:latin typeface="微软雅黑"/>
+              </a:defRPr>
+            </a:pPr>
+            <a:r>
+              <a:t>• 数据处理：Math.NET Numerics（数值计算）</a:t>
+            </a:r>
+          </a:p>
+          <a:p>
+            <a:pPr>
+              <a:defRPr sz="1200">
+                <a:latin typeface="微软雅黑"/>
+              </a:defRPr>
+            </a:pPr>
+          </a:p>
+          <a:p>
+            <a:pPr>
+              <a:defRPr sz="1200">
+                <a:latin typeface="微软雅黑"/>
+              </a:defRPr>
+            </a:pPr>
+            <a:r>
+              <a:t>二、模块划分</a:t>
+            </a:r>
+          </a:p>
+          <a:p>
+            <a:pPr>
+              <a:defRPr sz="1200">
+                <a:latin typeface="微软雅黑"/>
+              </a:defRPr>
+            </a:pPr>
+            <a:r>
+              <a:t>1. 仪器通信模块：VISA连接、SCPI命令封装、数据读取</a:t>
+            </a:r>
+          </a:p>
+          <a:p>
+            <a:pPr>
+              <a:defRPr sz="1200">
+                <a:latin typeface="微软雅黑"/>
+              </a:defRPr>
+            </a:pPr>
+            <a:r>
+              <a:t>2. 数据采集模块：采样控制、数据缓存、同步管理</a:t>
+            </a:r>
+          </a:p>
+          <a:p>
+            <a:pPr>
+              <a:defRPr sz="1200">
+                <a:latin typeface="微软雅黑"/>
+              </a:defRPr>
+            </a:pPr>
+            <a:r>
+              <a:t>3. 数据处理模块：温度转换、滤波算法、统计分析</a:t>
+            </a:r>
+          </a:p>
+          <a:p>
+            <a:pPr>
+              <a:defRPr sz="1200">
+                <a:latin typeface="微软雅黑"/>
+              </a:defRPr>
+            </a:pPr>
+            <a:r>
+              <a:t>4. 算法判断模块：入水检测、稳定值判断、T50计算</a:t>
+            </a:r>
+          </a:p>
+          <a:p>
+            <a:pPr>
+              <a:defRPr sz="1200">
+                <a:latin typeface="微软雅黑"/>
+              </a:defRPr>
+            </a:pPr>
+            <a:r>
+              <a:t>5. 用户界面模块：参数配置、实时显示、结果展示</a:t>
+            </a:r>
+          </a:p>
+          <a:p>
+            <a:pPr>
+              <a:defRPr sz="1200">
+                <a:latin typeface="微软雅黑"/>
+              </a:defRPr>
+            </a:pPr>
+            <a:r>
+              <a:t>6. 数据存储模块：数据库存储、历史数据管理</a:t>
+            </a:r>
+          </a:p>
+          <a:p>
+            <a:pPr>
+              <a:defRPr sz="1200">
+                <a:latin typeface="微软雅黑"/>
+              </a:defRPr>
+            </a:pPr>
+          </a:p>
+          <a:p>
+            <a:pPr>
+              <a:defRPr sz="1200">
+                <a:latin typeface="微软雅黑"/>
+              </a:defRPr>
+            </a:pPr>
+            <a:r>
+              <a:t>三、关键实现</a:t>
+            </a:r>
+          </a:p>
+          <a:p>
+            <a:pPr>
+              <a:defRPr sz="1200">
+                <a:latin typeface="微软雅黑"/>
+              </a:defRPr>
+            </a:pPr>
+            <a:r>
+              <a:t>• 多线程/异步采集，保证50Hz采样率</a:t>
+            </a:r>
+          </a:p>
+          <a:p>
+            <a:pPr>
+              <a:defRPr sz="1200">
+                <a:latin typeface="微软雅黑"/>
+              </a:defRPr>
+            </a:pPr>
+            <a:r>
+              <a:t>• 实时数据处理和显示</a:t>
+            </a:r>
+          </a:p>
+          <a:p>
+            <a:pPr>
+              <a:defRPr sz="1200">
+                <a:latin typeface="微软雅黑"/>
+              </a:defRPr>
+            </a:pPr>
+            <a:r>
+              <a:t>• 异常处理和错误恢复机制</a:t>
+            </a:r>
+          </a:p>
+        </p:txBody>
+      </p:sp>
+    </p:spTree>
+  </p:cSld>
+  <p:clrMapOvr>
+    <a:masterClrMapping/>
+  </p:clrMapOvr>
+</p:sld>
+</file>
+
+<file path=ppt/slides/slide18.xml><?xml version="1.0" encoding="utf-8"?>
+<p:sld xmlns:a="http://schemas.openxmlformats.org/drawingml/2006/main" xmlns:p="http://schemas.openxmlformats.org/presentationml/2006/main" xmlns:r="http://schemas.openxmlformats.org/officeDocument/2006/relationships">
+  <p:cSld>
+    <p:spTree>
+      <p:nvGrpSpPr>
+        <p:cNvPr id="1" name=""/>
+        <p:cNvGrpSpPr/>
+        <p:nvPr/>
+      </p:nvGrpSpPr>
+      <p:grpSpPr/>
+      <p:sp>
+        <p:nvSpPr>
+          <p:cNvPr id="2" name="Title 1"/>
+          <p:cNvSpPr>
+            <a:spLocks noGrp="1"/>
+          </p:cNvSpPr>
+          <p:nvPr>
+            <p:ph type="title"/>
+          </p:nvPr>
+        </p:nvSpPr>
+        <p:spPr/>
+        <p:txBody>
+          <a:bodyPr/>
+          <a:lstStyle/>
+          <a:p>
+            <a:r>
+              <a:t>实施计划</a:t>
+            </a:r>
+          </a:p>
+        </p:txBody>
+      </p:sp>
+      <p:sp>
+        <p:nvSpPr>
+          <p:cNvPr id="3" name="Content Placeholder 2"/>
+          <p:cNvSpPr>
+            <a:spLocks noGrp="1"/>
+          </p:cNvSpPr>
+          <p:nvPr>
+            <p:ph idx="1"/>
+          </p:nvPr>
+        </p:nvSpPr>
+        <p:spPr/>
+        <p:txBody>
+          <a:bodyPr/>
+          <a:lstStyle/>
+          <a:p/>
+        </p:txBody>
+      </p:sp>
+      <p:sp>
+        <p:nvSpPr>
+          <p:cNvPr id="4" name="TextBox 3"/>
+          <p:cNvSpPr txBox="1"/>
+          <p:nvPr/>
+        </p:nvSpPr>
+        <p:spPr>
+          <a:xfrm>
+            <a:off x="457200" y="1097280"/>
+            <a:ext cx="8229600" cy="5029200"/>
+          </a:xfrm>
+          <a:prstGeom prst="rect">
+            <a:avLst/>
+          </a:prstGeom>
+          <a:noFill/>
+        </p:spPr>
+        <p:txBody>
+          <a:bodyPr wrap="square">
+            <a:spAutoFit/>
+          </a:bodyPr>
+          <a:lstStyle/>
+          <a:p>
+            <a:pPr>
+              <a:defRPr sz="1200">
+                <a:latin typeface="微软雅黑"/>
+              </a:defRPr>
+            </a:pPr>
+            <a:r>
+              <a:t>一、开发阶段（预计2-3周）</a:t>
+            </a:r>
+          </a:p>
+          <a:p>
+            <a:pPr>
+              <a:defRPr sz="1200">
+                <a:latin typeface="微软雅黑"/>
+              </a:defRPr>
+            </a:pPr>
+            <a:r>
+              <a:t>阶段1：硬件验证（1-2天）</a:t>
+            </a:r>
+          </a:p>
+          <a:p>
+            <a:pPr>
+              <a:defRPr sz="1200">
+                <a:latin typeface="微软雅黑"/>
+              </a:defRPr>
+            </a:pPr>
+            <a:r>
+              <a:t>• 仪器连接测试</a:t>
+            </a:r>
+          </a:p>
+          <a:p>
+            <a:pPr>
+              <a:defRPr sz="1200">
+                <a:latin typeface="微软雅黑"/>
+              </a:defRPr>
+            </a:pPr>
+            <a:r>
+              <a:t>• SCPI命令验证</a:t>
+            </a:r>
+          </a:p>
+          <a:p>
+            <a:pPr>
+              <a:defRPr sz="1200">
+                <a:latin typeface="微软雅黑"/>
+              </a:defRPr>
+            </a:pPr>
+            <a:r>
+              <a:t>• 数据格式确认</a:t>
+            </a:r>
+          </a:p>
+          <a:p>
+            <a:pPr>
+              <a:defRPr sz="1200">
+                <a:latin typeface="微软雅黑"/>
+              </a:defRPr>
+            </a:pPr>
+          </a:p>
+          <a:p>
+            <a:pPr>
+              <a:defRPr sz="1200">
+                <a:latin typeface="微软雅黑"/>
+              </a:defRPr>
+            </a:pPr>
+            <a:r>
+              <a:t>阶段2：核心功能开发（1周）</a:t>
+            </a:r>
+          </a:p>
+          <a:p>
+            <a:pPr>
+              <a:defRPr sz="1200">
+                <a:latin typeface="微软雅黑"/>
+              </a:defRPr>
+            </a:pPr>
+            <a:r>
+              <a:t>• VISA通信模块</a:t>
+            </a:r>
+          </a:p>
+          <a:p>
+            <a:pPr>
+              <a:defRPr sz="1200">
+                <a:latin typeface="微软雅黑"/>
+              </a:defRPr>
+            </a:pPr>
+            <a:r>
+              <a:t>• 数据采集模块</a:t>
+            </a:r>
+          </a:p>
+          <a:p>
+            <a:pPr>
+              <a:defRPr sz="1200">
+                <a:latin typeface="微软雅黑"/>
+              </a:defRPr>
+            </a:pPr>
+            <a:r>
+              <a:t>• 数据处理和算法模块</a:t>
+            </a:r>
+          </a:p>
+          <a:p>
+            <a:pPr>
+              <a:defRPr sz="1200">
+                <a:latin typeface="微软雅黑"/>
+              </a:defRPr>
+            </a:pPr>
+          </a:p>
+          <a:p>
+            <a:pPr>
+              <a:defRPr sz="1200">
+                <a:latin typeface="微软雅黑"/>
+              </a:defRPr>
+            </a:pPr>
+            <a:r>
+              <a:t>阶段3：界面开发（1周）</a:t>
+            </a:r>
+          </a:p>
+          <a:p>
+            <a:pPr>
+              <a:defRPr sz="1200">
+                <a:latin typeface="微软雅黑"/>
+              </a:defRPr>
+            </a:pPr>
+            <a:r>
+              <a:t>• 用户界面设计</a:t>
+            </a:r>
+          </a:p>
+          <a:p>
+            <a:pPr>
+              <a:defRPr sz="1200">
+                <a:latin typeface="微软雅黑"/>
+              </a:defRPr>
+            </a:pPr>
+            <a:r>
+              <a:t>• 实时曲线显示</a:t>
+            </a:r>
+          </a:p>
+          <a:p>
+            <a:pPr>
+              <a:defRPr sz="1200">
+                <a:latin typeface="微软雅黑"/>
+              </a:defRPr>
+            </a:pPr>
+            <a:r>
+              <a:t>• 参数配置界面</a:t>
+            </a:r>
+          </a:p>
+          <a:p>
+            <a:pPr>
+              <a:defRPr sz="1200">
+                <a:latin typeface="微软雅黑"/>
+              </a:defRPr>
+            </a:pPr>
+          </a:p>
+          <a:p>
+            <a:pPr>
+              <a:defRPr sz="1200">
+                <a:latin typeface="微软雅黑"/>
+              </a:defRPr>
+            </a:pPr>
+            <a:r>
+              <a:t>阶段4：测试和优化（3-5天）</a:t>
+            </a:r>
+          </a:p>
+          <a:p>
+            <a:pPr>
+              <a:defRPr sz="1200">
+                <a:latin typeface="微软雅黑"/>
+              </a:defRPr>
+            </a:pPr>
+            <a:r>
+              <a:t>• 功能测试</a:t>
+            </a:r>
+          </a:p>
+          <a:p>
+            <a:pPr>
+              <a:defRPr sz="1200">
+                <a:latin typeface="微软雅黑"/>
+              </a:defRPr>
+            </a:pPr>
+            <a:r>
+              <a:t>• 性能优化</a:t>
+            </a:r>
+          </a:p>
+          <a:p>
+            <a:pPr>
+              <a:defRPr sz="1200">
+                <a:latin typeface="微软雅黑"/>
+              </a:defRPr>
+            </a:pPr>
+            <a:r>
+              <a:t>• 问题修复</a:t>
+            </a:r>
+          </a:p>
+          <a:p>
+            <a:pPr>
+              <a:defRPr sz="1200">
+                <a:latin typeface="微软雅黑"/>
+              </a:defRPr>
+            </a:pPr>
+          </a:p>
+          <a:p>
+            <a:pPr>
+              <a:defRPr sz="1200">
+                <a:latin typeface="微软雅黑"/>
+              </a:defRPr>
+            </a:pPr>
+            <a:r>
+              <a:t>二、关键里程碑</a:t>
+            </a:r>
+          </a:p>
+          <a:p>
+            <a:pPr>
+              <a:defRPr sz="1200">
+                <a:latin typeface="微软雅黑"/>
+              </a:defRPr>
+            </a:pPr>
+            <a:r>
+              <a:t>✓ 硬件连接成功</a:t>
+            </a:r>
+          </a:p>
+          <a:p>
+            <a:pPr>
+              <a:defRPr sz="1200">
+                <a:latin typeface="微软雅黑"/>
+              </a:defRPr>
+            </a:pPr>
+            <a:r>
+              <a:t>✓ 数据采集正常</a:t>
+            </a:r>
+          </a:p>
+          <a:p>
+            <a:pPr>
+              <a:defRPr sz="1200">
+                <a:latin typeface="微软雅黑"/>
+              </a:defRPr>
+            </a:pPr>
+            <a:r>
+              <a:t>✓ 算法判断准确</a:t>
+            </a:r>
+          </a:p>
+          <a:p>
+            <a:pPr>
+              <a:defRPr sz="1200">
+                <a:latin typeface="微软雅黑"/>
+              </a:defRPr>
+            </a:pPr>
+            <a:r>
+              <a:t>✓ 界面功能完整</a:t>
+            </a:r>
+          </a:p>
+          <a:p>
+            <a:pPr>
+              <a:defRPr sz="1200">
+                <a:latin typeface="微软雅黑"/>
+              </a:defRPr>
+            </a:pPr>
+            <a:r>
+              <a:t>✓ 测试验证通过</a:t>
+            </a:r>
+          </a:p>
+        </p:txBody>
+      </p:sp>
+    </p:spTree>
+  </p:cSld>
+  <p:clrMapOvr>
+    <a:masterClrMapping/>
+  </p:clrMapOvr>
+</p:sld>
+</file>
+
+<file path=ppt/slides/slide19.xml><?xml version="1.0" encoding="utf-8"?>
+<p:sld xmlns:a="http://schemas.openxmlformats.org/drawingml/2006/main" xmlns:p="http://schemas.openxmlformats.org/presentationml/2006/main" xmlns:r="http://schemas.openxmlformats.org/officeDocument/2006/relationships">
+  <p:cSld>
+    <p:spTree>
+      <p:nvGrpSpPr>
+        <p:cNvPr id="1" name=""/>
+        <p:cNvGrpSpPr/>
+        <p:nvPr/>
+      </p:nvGrpSpPr>
+      <p:grpSpPr/>
+      <p:sp>
+        <p:nvSpPr>
+          <p:cNvPr id="2" name="Title 1"/>
+          <p:cNvSpPr>
+            <a:spLocks noGrp="1"/>
+          </p:cNvSpPr>
+          <p:nvPr>
+            <p:ph type="title"/>
+          </p:nvPr>
+        </p:nvSpPr>
+        <p:spPr/>
+        <p:txBody>
+          <a:bodyPr/>
+          <a:lstStyle/>
+          <a:p>
+            <a:r>
+              <a:t>关键技术要点</a:t>
+            </a:r>
+          </a:p>
+        </p:txBody>
+      </p:sp>
+      <p:sp>
+        <p:nvSpPr>
+          <p:cNvPr id="3" name="Content Placeholder 2"/>
+          <p:cNvSpPr>
+            <a:spLocks noGrp="1"/>
+          </p:cNvSpPr>
+          <p:nvPr>
+            <p:ph idx="1"/>
+          </p:nvPr>
+        </p:nvSpPr>
+        <p:spPr/>
+        <p:txBody>
+          <a:bodyPr/>
+          <a:lstStyle/>
+          <a:p/>
+        </p:txBody>
+      </p:sp>
+      <p:sp>
+        <p:nvSpPr>
+          <p:cNvPr id="4" name="TextBox 3"/>
+          <p:cNvSpPr txBox="1"/>
+          <p:nvPr/>
+        </p:nvSpPr>
+        <p:spPr>
+          <a:xfrm>
+            <a:off x="457200" y="1097280"/>
+            <a:ext cx="8229600" cy="5029200"/>
+          </a:xfrm>
+          <a:prstGeom prst="rect">
+            <a:avLst/>
+          </a:prstGeom>
+          <a:noFill/>
+        </p:spPr>
+        <p:txBody>
+          <a:bodyPr wrap="square">
+            <a:spAutoFit/>
+          </a:bodyPr>
+          <a:lstStyle/>
+          <a:p>
+            <a:pPr>
+              <a:defRPr sz="1200">
+                <a:latin typeface="微软雅黑"/>
+              </a:defRPr>
+            </a:pPr>
+            <a:r>
+              <a:t>一、同步采样实现</a:t>
+            </a:r>
+          </a:p>
+          <a:p>
+            <a:pPr>
+              <a:defRPr sz="1200">
+                <a:latin typeface="微软雅黑"/>
+              </a:defRPr>
+            </a:pPr>
+            <a:r>
+              <a:t>• DAQM909A支持4通道真正同步采样</a:t>
+            </a:r>
+          </a:p>
+          <a:p>
+            <a:pPr>
+              <a:defRPr sz="1200">
+                <a:latin typeface="微软雅黑"/>
+              </a:defRPr>
+            </a:pPr>
+            <a:r>
+              <a:t>• 使用ROUT:SCAN配置扫描列表</a:t>
+            </a:r>
+          </a:p>
+          <a:p>
+            <a:pPr>
+              <a:defRPr sz="1200">
+                <a:latin typeface="微软雅黑"/>
+              </a:defRPr>
+            </a:pPr>
+            <a:r>
+              <a:t>• 采样间隔设置为20ms（对应50Hz）</a:t>
+            </a:r>
+          </a:p>
+          <a:p>
+            <a:pPr>
+              <a:defRPr sz="1200">
+                <a:latin typeface="微软雅黑"/>
+              </a:defRPr>
+            </a:pPr>
+            <a:r>
+              <a:t>• 确保通道间无时间差</a:t>
+            </a:r>
+          </a:p>
+          <a:p>
+            <a:pPr>
+              <a:defRPr sz="1200">
+                <a:latin typeface="微软雅黑"/>
+              </a:defRPr>
+            </a:pPr>
+          </a:p>
+          <a:p>
+            <a:pPr>
+              <a:defRPr sz="1200">
+                <a:latin typeface="微软雅黑"/>
+              </a:defRPr>
+            </a:pPr>
+            <a:r>
+              <a:t>二、高频采集优化</a:t>
+            </a:r>
+          </a:p>
+          <a:p>
+            <a:pPr>
+              <a:defRPr sz="1200">
+                <a:latin typeface="微软雅黑"/>
+              </a:defRPr>
+            </a:pPr>
+            <a:r>
+              <a:t>• 使用缓冲读取提高效率</a:t>
+            </a:r>
+          </a:p>
+          <a:p>
+            <a:pPr>
+              <a:defRPr sz="1200">
+                <a:latin typeface="微软雅黑"/>
+              </a:defRPr>
+            </a:pPr>
+            <a:r>
+              <a:t>• 异步/多线程处理避免阻塞</a:t>
+            </a:r>
+          </a:p>
+          <a:p>
+            <a:pPr>
+              <a:defRPr sz="1200">
+                <a:latin typeface="微软雅黑"/>
+              </a:defRPr>
+            </a:pPr>
+            <a:r>
+              <a:t>• 数据队列管理防止丢失</a:t>
+            </a:r>
+          </a:p>
+          <a:p>
+            <a:pPr>
+              <a:defRPr sz="1200">
+                <a:latin typeface="微软雅黑"/>
+              </a:defRPr>
+            </a:pPr>
+            <a:r>
+              <a:t>• 优化SCPI命令减少通信延迟</a:t>
+            </a:r>
+          </a:p>
+          <a:p>
+            <a:pPr>
+              <a:defRPr sz="1200">
+                <a:latin typeface="微软雅黑"/>
+              </a:defRPr>
+            </a:pPr>
+          </a:p>
+          <a:p>
+            <a:pPr>
+              <a:defRPr sz="1200">
+                <a:latin typeface="微软雅黑"/>
+              </a:defRPr>
+            </a:pPr>
+            <a:r>
+              <a:t>三、算法精度保证</a:t>
+            </a:r>
+          </a:p>
+          <a:p>
+            <a:pPr>
+              <a:defRPr sz="1200">
+                <a:latin typeface="微软雅黑"/>
+              </a:defRPr>
+            </a:pPr>
+            <a:r>
+              <a:t>• 入水检测：多数据点验证，避免误判</a:t>
+            </a:r>
+          </a:p>
+          <a:p>
+            <a:pPr>
+              <a:defRPr sz="1200">
+                <a:latin typeface="微软雅黑"/>
+              </a:defRPr>
+            </a:pPr>
+            <a:r>
+              <a:t>• 稳定值判断：变化率阈值可配置</a:t>
+            </a:r>
+          </a:p>
+          <a:p>
+            <a:pPr>
+              <a:defRPr sz="1200">
+                <a:latin typeface="微软雅黑"/>
+              </a:defRPr>
+            </a:pPr>
+            <a:r>
+              <a:t>• T50计算：插值算法提高精度</a:t>
+            </a:r>
+          </a:p>
+          <a:p>
+            <a:pPr>
+              <a:defRPr sz="1200">
+                <a:latin typeface="微软雅黑"/>
+              </a:defRPr>
+            </a:pPr>
+            <a:r>
+              <a:t>• 异常值过滤：Z-score或IQR方法</a:t>
+            </a:r>
+          </a:p>
+          <a:p>
+            <a:pPr>
+              <a:defRPr sz="1200">
+                <a:latin typeface="微软雅黑"/>
+              </a:defRPr>
+            </a:pPr>
+          </a:p>
+          <a:p>
+            <a:pPr>
+              <a:defRPr sz="1200">
+                <a:latin typeface="微软雅黑"/>
+              </a:defRPr>
+            </a:pPr>
+            <a:r>
+              <a:t>四、系统可靠性</a:t>
+            </a:r>
+          </a:p>
+          <a:p>
+            <a:pPr>
+              <a:defRPr sz="1200">
+                <a:latin typeface="微软雅黑"/>
+              </a:defRPr>
+            </a:pPr>
+            <a:r>
+              <a:t>• 连接异常自动重连</a:t>
+            </a:r>
+          </a:p>
+          <a:p>
+            <a:pPr>
+              <a:defRPr sz="1200">
+                <a:latin typeface="微软雅黑"/>
+              </a:defRPr>
+            </a:pPr>
+            <a:r>
+              <a:t>• 数据完整性验证</a:t>
+            </a:r>
+          </a:p>
+          <a:p>
+            <a:pPr>
+              <a:defRPr sz="1200">
+                <a:latin typeface="微软雅黑"/>
+              </a:defRPr>
+            </a:pPr>
+            <a:r>
+              <a:t>• 测试中断恢复机制</a:t>
+            </a:r>
+          </a:p>
+          <a:p>
+            <a:pPr>
+              <a:defRPr sz="1200">
+                <a:latin typeface="微软雅黑"/>
+              </a:defRPr>
+            </a:pPr>
+            <a:r>
+              <a:t>• 详细日志记录</a:t>
+            </a:r>
+          </a:p>
+        </p:txBody>
+      </p:sp>
+    </p:spTree>
+  </p:cSld>
+  <p:clrMapOvr>
+    <a:masterClrMapping/>
+  </p:clrMapOvr>
+</p:sld>
+</file>
+
 <file path=ppt/slides/slide2.xml><?xml version="1.0" encoding="utf-8"?>
 <p:sld xmlns:a="http://schemas.openxmlformats.org/drawingml/2006/main" xmlns:r="http://schemas.openxmlformats.org/officeDocument/2006/relationships" xmlns:p="http://schemas.openxmlformats.org/presentationml/2006/main">
   <p:cSld>
@@ -16999,6 +18398,306 @@
               <a:latin typeface="汉仪君黑-45简" panose="020B0604020202020204" charset="-122"/>
               <a:ea typeface="汉仪君黑-45简" panose="020B0604020202020204" charset="-122"/>
             </a:endParaRPr>
+          </a:p>
+        </p:txBody>
+      </p:sp>
+    </p:spTree>
+  </p:cSld>
+  <p:clrMapOvr>
+    <a:masterClrMapping/>
+  </p:clrMapOvr>
+</p:sld>
+</file>
+
+<file path=ppt/slides/slide20.xml><?xml version="1.0" encoding="utf-8"?>
+<p:sld xmlns:a="http://schemas.openxmlformats.org/drawingml/2006/main" xmlns:p="http://schemas.openxmlformats.org/presentationml/2006/main" xmlns:r="http://schemas.openxmlformats.org/officeDocument/2006/relationships">
+  <p:cSld>
+    <p:spTree>
+      <p:nvGrpSpPr>
+        <p:cNvPr id="1" name=""/>
+        <p:cNvGrpSpPr/>
+        <p:nvPr/>
+      </p:nvGrpSpPr>
+      <p:grpSpPr/>
+      <p:sp>
+        <p:nvSpPr>
+          <p:cNvPr id="2" name="Title 1"/>
+          <p:cNvSpPr>
+            <a:spLocks noGrp="1"/>
+          </p:cNvSpPr>
+          <p:nvPr>
+            <p:ph type="title"/>
+          </p:nvPr>
+        </p:nvSpPr>
+        <p:spPr/>
+        <p:txBody>
+          <a:bodyPr/>
+          <a:lstStyle/>
+          <a:p>
+            <a:r>
+              <a:t>方案优势总结</a:t>
+            </a:r>
+          </a:p>
+        </p:txBody>
+      </p:sp>
+      <p:sp>
+        <p:nvSpPr>
+          <p:cNvPr id="3" name="Content Placeholder 2"/>
+          <p:cNvSpPr>
+            <a:spLocks noGrp="1"/>
+          </p:cNvSpPr>
+          <p:nvPr>
+            <p:ph idx="1"/>
+          </p:nvPr>
+        </p:nvSpPr>
+        <p:spPr/>
+        <p:txBody>
+          <a:bodyPr/>
+          <a:lstStyle/>
+          <a:p/>
+        </p:txBody>
+      </p:sp>
+      <p:sp>
+        <p:nvSpPr>
+          <p:cNvPr id="4" name="TextBox 3"/>
+          <p:cNvSpPr txBox="1"/>
+          <p:nvPr/>
+        </p:nvSpPr>
+        <p:spPr>
+          <a:xfrm>
+            <a:off x="457200" y="1097280"/>
+            <a:ext cx="8229600" cy="5029200"/>
+          </a:xfrm>
+          <a:prstGeom prst="rect">
+            <a:avLst/>
+          </a:prstGeom>
+          <a:noFill/>
+        </p:spPr>
+        <p:txBody>
+          <a:bodyPr wrap="square">
+            <a:spAutoFit/>
+          </a:bodyPr>
+          <a:lstStyle/>
+          <a:p>
+            <a:pPr>
+              <a:defRPr sz="1200">
+                <a:latin typeface="微软雅黑"/>
+              </a:defRPr>
+            </a:pPr>
+            <a:r>
+              <a:t>一、硬件优势</a:t>
+            </a:r>
+          </a:p>
+          <a:p>
+            <a:pPr>
+              <a:defRPr sz="1200">
+                <a:latin typeface="微软雅黑"/>
+              </a:defRPr>
+            </a:pPr>
+            <a:r>
+              <a:t>✓ DAQ970A多通道数据采集能力</a:t>
+            </a:r>
+          </a:p>
+          <a:p>
+            <a:pPr>
+              <a:defRPr sz="1200">
+                <a:latin typeface="微软雅黑"/>
+              </a:defRPr>
+            </a:pPr>
+            <a:r>
+              <a:t>✓ DAQM909A 4通道真正同步采样</a:t>
+            </a:r>
+          </a:p>
+          <a:p>
+            <a:pPr>
+              <a:defRPr sz="1200">
+                <a:latin typeface="微软雅黑"/>
+              </a:defRPr>
+            </a:pPr>
+            <a:r>
+              <a:t>✓ 高精度测量（6.5位分辨率）</a:t>
+            </a:r>
+          </a:p>
+          <a:p>
+            <a:pPr>
+              <a:defRPr sz="1200">
+                <a:latin typeface="微软雅黑"/>
+              </a:defRPr>
+            </a:pPr>
+            <a:r>
+              <a:t>✓ 可扩展性（可添加更多模块）</a:t>
+            </a:r>
+          </a:p>
+          <a:p>
+            <a:pPr>
+              <a:defRPr sz="1200">
+                <a:latin typeface="微软雅黑"/>
+              </a:defRPr>
+            </a:pPr>
+          </a:p>
+          <a:p>
+            <a:pPr>
+              <a:defRPr sz="1200">
+                <a:latin typeface="微软雅黑"/>
+              </a:defRPr>
+            </a:pPr>
+            <a:r>
+              <a:t>二、软件优势</a:t>
+            </a:r>
+          </a:p>
+          <a:p>
+            <a:pPr>
+              <a:defRPr sz="1200">
+                <a:latin typeface="微软雅黑"/>
+              </a:defRPr>
+            </a:pPr>
+            <a:r>
+              <a:t>✓ C#开发，界面友好，易于维护</a:t>
+            </a:r>
+          </a:p>
+          <a:p>
+            <a:pPr>
+              <a:defRPr sz="1200">
+                <a:latin typeface="微软雅黑"/>
+              </a:defRPr>
+            </a:pPr>
+            <a:r>
+              <a:t>✓ 实时数据处理和显示</a:t>
+            </a:r>
+          </a:p>
+          <a:p>
+            <a:pPr>
+              <a:defRPr sz="1200">
+                <a:latin typeface="微软雅黑"/>
+              </a:defRPr>
+            </a:pPr>
+            <a:r>
+              <a:t>✓ 自动化判断，减少人工干预</a:t>
+            </a:r>
+          </a:p>
+          <a:p>
+            <a:pPr>
+              <a:defRPr sz="1200">
+                <a:latin typeface="微软雅黑"/>
+              </a:defRPr>
+            </a:pPr>
+            <a:r>
+              <a:t>✓ 数据可追溯，支持历史查询</a:t>
+            </a:r>
+          </a:p>
+          <a:p>
+            <a:pPr>
+              <a:defRPr sz="1200">
+                <a:latin typeface="微软雅黑"/>
+              </a:defRPr>
+            </a:pPr>
+          </a:p>
+          <a:p>
+            <a:pPr>
+              <a:defRPr sz="1200">
+                <a:latin typeface="微软雅黑"/>
+              </a:defRPr>
+            </a:pPr>
+            <a:r>
+              <a:t>三、效率提升</a:t>
+            </a:r>
+          </a:p>
+          <a:p>
+            <a:pPr>
+              <a:defRPr sz="1200">
+                <a:latin typeface="微软雅黑"/>
+              </a:defRPr>
+            </a:pPr>
+            <a:r>
+              <a:t>✓ 4通道同时测试，效率提升4倍</a:t>
+            </a:r>
+          </a:p>
+          <a:p>
+            <a:pPr>
+              <a:defRPr sz="1200">
+                <a:latin typeface="微软雅黑"/>
+              </a:defRPr>
+            </a:pPr>
+            <a:r>
+              <a:t>✓ 一次采集完成所有判断，无需二次采集</a:t>
+            </a:r>
+          </a:p>
+          <a:p>
+            <a:pPr>
+              <a:defRPr sz="1200">
+                <a:latin typeface="微软雅黑"/>
+              </a:defRPr>
+            </a:pPr>
+            <a:r>
+              <a:t>✓ 高频采集（50Hz）保证数据精度</a:t>
+            </a:r>
+          </a:p>
+          <a:p>
+            <a:pPr>
+              <a:defRPr sz="1200">
+                <a:latin typeface="微软雅黑"/>
+              </a:defRPr>
+            </a:pPr>
+            <a:r>
+              <a:t>✓ 自动化流程，减少人工操作</a:t>
+            </a:r>
+          </a:p>
+          <a:p>
+            <a:pPr>
+              <a:defRPr sz="1200">
+                <a:latin typeface="微软雅黑"/>
+              </a:defRPr>
+            </a:pPr>
+          </a:p>
+          <a:p>
+            <a:pPr>
+              <a:defRPr sz="1200">
+                <a:latin typeface="微软雅黑"/>
+              </a:defRPr>
+            </a:pPr>
+            <a:r>
+              <a:t>四、技术先进性</a:t>
+            </a:r>
+          </a:p>
+          <a:p>
+            <a:pPr>
+              <a:defRPr sz="1200">
+                <a:latin typeface="微软雅黑"/>
+              </a:defRPr>
+            </a:pPr>
+            <a:r>
+              <a:t>✓ 同步采样技术，消除时间差</a:t>
+            </a:r>
+          </a:p>
+          <a:p>
+            <a:pPr>
+              <a:defRPr sz="1200">
+                <a:latin typeface="微软雅黑"/>
+              </a:defRPr>
+            </a:pPr>
+            <a:r>
+              <a:t>✓ 智能算法判断，提高准确性</a:t>
+            </a:r>
+          </a:p>
+          <a:p>
+            <a:pPr>
+              <a:defRPr sz="1200">
+                <a:latin typeface="微软雅黑"/>
+              </a:defRPr>
+            </a:pPr>
+            <a:r>
+              <a:t>✓ 模块化设计，易于扩展</a:t>
+            </a:r>
+          </a:p>
+          <a:p>
+            <a:pPr>
+              <a:defRPr sz="1200">
+                <a:latin typeface="微软雅黑"/>
+              </a:defRPr>
+            </a:pPr>
+            <a:r>
+              <a:t>✓ 标准化接口，便于集成</a:t>
+            </a:r>
           </a:p>
         </p:txBody>
       </p:sp>

</xml_diff>